<commit_message>
getting "stthomas.png" from folder, as google drive connection not working
</commit_message>
<xml_diff>
--- a/StThomas-PowerPoint-AU.pptx
+++ b/StThomas-PowerPoint-AU.pptx
@@ -12,8 +12,8 @@
   </p:handoutMasterIdLst>
   <p:sldIdLst>
     <p:sldId id="261" r:id="rId2"/>
-    <p:sldId id="265" r:id="rId3"/>
-    <p:sldId id="262" r:id="rId4"/>
+    <p:sldId id="262" r:id="rId3"/>
+    <p:sldId id="265" r:id="rId4"/>
     <p:sldId id="258" r:id="rId5"/>
     <p:sldId id="264" r:id="rId6"/>
     <p:sldId id="260" r:id="rId7"/>
@@ -22,17 +22,17 @@
   <p:notesSz cx="6797675" cy="9926638"/>
   <p:embeddedFontLst>
     <p:embeddedFont>
-      <p:font typeface="AU Passata" panose="020B0503030502030804" pitchFamily="34" charset="77"/>
+      <p:font typeface="AU Passata" panose="020B0604020202020204" charset="0"/>
       <p:regular r:id="rId10"/>
       <p:bold r:id="rId11"/>
     </p:embeddedFont>
     <p:embeddedFont>
-      <p:font typeface="AU Passata Light" panose="020B0303030902030804" pitchFamily="34" charset="77"/>
+      <p:font typeface="AU Passata Light" panose="020B0604020202020204" charset="0"/>
       <p:regular r:id="rId12"/>
       <p:bold r:id="rId13"/>
     </p:embeddedFont>
     <p:embeddedFont>
-      <p:font typeface="AU Peto" pitchFamily="82" charset="77"/>
+      <p:font typeface="AU Peto" panose="020B0604020202020204" charset="0"/>
       <p:regular r:id="rId14"/>
       <p:bold r:id="rId15"/>
     </p:embeddedFont>
@@ -51,7 +51,7 @@
       <p:boldItalic r:id="rId23"/>
     </p:embeddedFont>
     <p:embeddedFont>
-      <p:font typeface="Wingdings 3" pitchFamily="2" charset="2"/>
+      <p:font typeface="Wingdings 3" panose="05040102010807070707" pitchFamily="18" charset="2"/>
       <p:regular r:id="rId24"/>
     </p:embeddedFont>
   </p:embeddedFontLst>
@@ -1009,7 +1009,7 @@
               <a:pPr>
                 <a:defRPr/>
               </a:pPr>
-              <a:t>2</a:t>
+              <a:t>3</a:t>
             </a:fld>
             <a:endParaRPr lang="en-GB" dirty="0"/>
           </a:p>
@@ -1817,7 +1817,7 @@
             <a:fld id="{78417F83-4CBA-48F2-BAD0-783AE3701E32}" type="datetimeFigureOut">
               <a:rPr lang="da-DK" smtClean="0"/>
               <a:pPr/>
-              <a:t>26.04.2021</a:t>
+              <a:t>26-04-2021</a:t>
             </a:fld>
             <a:r>
               <a:rPr lang="da-DK" dirty="0"/>
@@ -2027,7 +2027,7 @@
             <a:fld id="{78417F83-4CBA-48F2-BAD0-783AE3701E32}" type="datetimeFigureOut">
               <a:rPr lang="da-DK" smtClean="0"/>
               <a:pPr/>
-              <a:t>26.04.2021</a:t>
+              <a:t>26-04-2021</a:t>
             </a:fld>
             <a:r>
               <a:rPr lang="da-DK" dirty="0"/>
@@ -2268,7 +2268,7 @@
             <a:fld id="{78417F83-4CBA-48F2-BAD0-783AE3701E32}" type="datetimeFigureOut">
               <a:rPr lang="da-DK" smtClean="0"/>
               <a:pPr/>
-              <a:t>26.04.2021</a:t>
+              <a:t>26-04-2021</a:t>
             </a:fld>
             <a:r>
               <a:rPr lang="da-DK" dirty="0"/>
@@ -2438,7 +2438,7 @@
             <a:fld id="{78417F83-4CBA-48F2-BAD0-783AE3701E32}" type="datetimeFigureOut">
               <a:rPr lang="da-DK" smtClean="0"/>
               <a:pPr/>
-              <a:t>26.04.2021</a:t>
+              <a:t>26-04-2021</a:t>
             </a:fld>
             <a:r>
               <a:rPr lang="da-DK" dirty="0"/>
@@ -2612,7 +2612,7 @@
             <a:fld id="{78417F83-4CBA-48F2-BAD0-783AE3701E32}" type="datetimeFigureOut">
               <a:rPr lang="da-DK" smtClean="0"/>
               <a:pPr/>
-              <a:t>26.04.2021</a:t>
+              <a:t>26-04-2021</a:t>
             </a:fld>
             <a:r>
               <a:rPr lang="da-DK" dirty="0"/>
@@ -2949,7 +2949,7 @@
             <a:fld id="{78417F83-4CBA-48F2-BAD0-783AE3701E32}" type="datetimeFigureOut">
               <a:rPr lang="da-DK" smtClean="0"/>
               <a:pPr/>
-              <a:t>26.04.2021</a:t>
+              <a:t>26-04-2021</a:t>
             </a:fld>
             <a:r>
               <a:rPr lang="da-DK" dirty="0"/>
@@ -3120,7 +3120,7 @@
             <a:fld id="{78417F83-4CBA-48F2-BAD0-783AE3701E32}" type="datetimeFigureOut">
               <a:rPr lang="da-DK" smtClean="0"/>
               <a:pPr/>
-              <a:t>26.04.2021</a:t>
+              <a:t>26-04-2021</a:t>
             </a:fld>
             <a:r>
               <a:rPr lang="da-DK" dirty="0"/>
@@ -3316,7 +3316,7 @@
             <a:fld id="{78417F83-4CBA-48F2-BAD0-783AE3701E32}" type="datetimeFigureOut">
               <a:rPr lang="da-DK" smtClean="0"/>
               <a:pPr/>
-              <a:t>26.04.2021</a:t>
+              <a:t>26-04-2021</a:t>
             </a:fld>
             <a:r>
               <a:rPr lang="da-DK" dirty="0"/>
@@ -3485,7 +3485,7 @@
             <a:fld id="{78417F83-4CBA-48F2-BAD0-783AE3701E32}" type="datetimeFigureOut">
               <a:rPr lang="da-DK" smtClean="0"/>
               <a:pPr/>
-              <a:t>26.04.2021</a:t>
+              <a:t>26-04-2021</a:t>
             </a:fld>
             <a:r>
               <a:rPr lang="da-DK" dirty="0"/>
@@ -3639,7 +3639,7 @@
             <a:fld id="{78417F83-4CBA-48F2-BAD0-783AE3701E32}" type="datetimeFigureOut">
               <a:rPr lang="da-DK" smtClean="0"/>
               <a:pPr/>
-              <a:t>26.04.2021</a:t>
+              <a:t>26-04-2021</a:t>
             </a:fld>
             <a:r>
               <a:rPr lang="da-DK" dirty="0"/>
@@ -4528,7 +4528,7 @@
             <a:fld id="{78417F83-4CBA-48F2-BAD0-783AE3701E32}" type="datetimeFigureOut">
               <a:rPr lang="da-DK" smtClean="0"/>
               <a:pPr/>
-              <a:t>26.04.2021</a:t>
+              <a:t>26-04-2021</a:t>
             </a:fld>
             <a:r>
               <a:rPr lang="da-DK" dirty="0"/>
@@ -5345,7 +5345,7 @@
             <a:fld id="{78417F83-4CBA-48F2-BAD0-783AE3701E32}" type="datetimeFigureOut">
               <a:rPr lang="da-DK" smtClean="0"/>
               <a:pPr/>
-              <a:t>26.04.2021</a:t>
+              <a:t>26-04-2021</a:t>
             </a:fld>
             <a:r>
               <a:rPr lang="da-DK" dirty="0"/>
@@ -5575,7 +5575,7 @@
             <a:fld id="{78417F83-4CBA-48F2-BAD0-783AE3701E32}" type="datetimeFigureOut">
               <a:rPr lang="da-DK" smtClean="0"/>
               <a:pPr/>
-              <a:t>26.04.2021</a:t>
+              <a:t>26-04-2021</a:t>
             </a:fld>
             <a:r>
               <a:rPr lang="da-DK" dirty="0"/>
@@ -6282,7 +6282,7 @@
             <a:fld id="{78417F83-4CBA-48F2-BAD0-783AE3701E32}" type="datetimeFigureOut">
               <a:rPr lang="da-DK" smtClean="0"/>
               <a:pPr/>
-              <a:t>26.04.2021</a:t>
+              <a:t>26-04-2021</a:t>
             </a:fld>
             <a:r>
               <a:rPr lang="da-DK" dirty="0"/>
@@ -6573,7 +6573,7 @@
             <a:fld id="{78417F83-4CBA-48F2-BAD0-783AE3701E32}" type="datetimeFigureOut">
               <a:rPr lang="da-DK" smtClean="0"/>
               <a:pPr/>
-              <a:t>26.04.2021</a:t>
+              <a:t>26-04-2021</a:t>
             </a:fld>
             <a:r>
               <a:rPr lang="da-DK" dirty="0"/>
@@ -6947,7 +6947,7 @@
             <a:fld id="{78417F83-4CBA-48F2-BAD0-783AE3701E32}" type="datetimeFigureOut">
               <a:rPr lang="da-DK" smtClean="0"/>
               <a:pPr/>
-              <a:t>26.04.2021</a:t>
+              <a:t>26-04-2021</a:t>
             </a:fld>
             <a:r>
               <a:rPr lang="da-DK" dirty="0"/>
@@ -7374,7 +7374,7 @@
             <a:fld id="{78417F83-4CBA-48F2-BAD0-783AE3701E32}" type="datetimeFigureOut">
               <a:rPr lang="da-DK" smtClean="0"/>
               <a:pPr/>
-              <a:t>26.04.2021</a:t>
+              <a:t>26-04-2021</a:t>
             </a:fld>
             <a:r>
               <a:rPr lang="da-DK" dirty="0"/>
@@ -7814,7 +7814,7 @@
             <a:fld id="{78417F83-4CBA-48F2-BAD0-783AE3701E32}" type="datetimeFigureOut">
               <a:rPr lang="da-DK" smtClean="0"/>
               <a:pPr/>
-              <a:t>26.04.2021</a:t>
+              <a:t>26-04-2021</a:t>
             </a:fld>
             <a:r>
               <a:rPr lang="da-DK" dirty="0"/>
@@ -7982,7 +7982,7 @@
             <a:fld id="{78417F83-4CBA-48F2-BAD0-783AE3701E32}" type="datetimeFigureOut">
               <a:rPr lang="da-DK" smtClean="0"/>
               <a:pPr/>
-              <a:t>26.04.2021</a:t>
+              <a:t>26-04-2021</a:t>
             </a:fld>
             <a:r>
               <a:rPr lang="da-DK" dirty="0"/>
@@ -8163,7 +8163,7 @@
             <a:fld id="{78417F83-4CBA-48F2-BAD0-783AE3701E32}" type="datetimeFigureOut">
               <a:rPr lang="da-DK" smtClean="0"/>
               <a:pPr/>
-              <a:t>26.04.2021</a:t>
+              <a:t>26-04-2021</a:t>
             </a:fld>
             <a:r>
               <a:rPr lang="da-DK" dirty="0"/>
@@ -8936,7 +8936,7 @@
             <a:fld id="{78417F83-4CBA-48F2-BAD0-783AE3701E32}" type="datetimeFigureOut">
               <a:rPr lang="da-DK" smtClean="0"/>
               <a:pPr/>
-              <a:t>26.04.2021</a:t>
+              <a:t>26-04-2021</a:t>
             </a:fld>
             <a:r>
               <a:rPr lang="da-DK"/>
@@ -9590,7 +9590,7 @@
       </p:grpSpPr>
       <p:sp>
         <p:nvSpPr>
-          <p:cNvPr id="4" name="Title 3"/>
+          <p:cNvPr id="3" name="Title 2"/>
           <p:cNvSpPr>
             <a:spLocks noGrp="1"/>
           </p:cNvSpPr>
@@ -9603,10 +9603,7 @@
           <a:bodyPr/>
           <a:lstStyle/>
           <a:p>
-            <a:r>
-              <a:rPr lang="da-DK" dirty="0"/>
-              <a:t>Overordnet indhold (note-slide)</a:t>
-            </a:r>
+            <a:endParaRPr lang="da-DK" dirty="0"/>
           </a:p>
         </p:txBody>
       </p:sp>
@@ -9625,210 +9622,6 @@
           <a:bodyPr/>
           <a:lstStyle/>
           <a:p>
-            <a:r>
-              <a:rPr lang="en-GB" dirty="0" err="1"/>
-              <a:t>Overordnet</a:t>
-            </a:r>
-            <a:r>
-              <a:rPr lang="en-GB" dirty="0"/>
-              <a:t> </a:t>
-            </a:r>
-            <a:r>
-              <a:rPr lang="en-GB" dirty="0" err="1"/>
-              <a:t>indhold</a:t>
-            </a:r>
-            <a:r>
-              <a:rPr lang="en-GB"/>
-              <a:t>:</a:t>
-            </a:r>
-            <a:br>
-              <a:rPr lang="en-GB"/>
-            </a:br>
-            <a:endParaRPr lang="en-GB" dirty="0"/>
-          </a:p>
-          <a:p>
-            <a:pPr marL="457200" indent="-457200">
-              <a:buFont typeface="+mj-lt"/>
-              <a:buAutoNum type="arabicPeriod"/>
-            </a:pPr>
-            <a:r>
-              <a:rPr lang="en-GB" dirty="0" err="1"/>
-              <a:t>Agentadfærd</a:t>
-            </a:r>
-            <a:endParaRPr lang="en-GB" dirty="0"/>
-          </a:p>
-          <a:p>
-            <a:pPr marL="457200" indent="-457200">
-              <a:buFont typeface="+mj-lt"/>
-              <a:buAutoNum type="arabicPeriod"/>
-            </a:pPr>
-            <a:r>
-              <a:rPr lang="en-GB" dirty="0" err="1"/>
-              <a:t>Undervisningskontekst</a:t>
-            </a:r>
-            <a:endParaRPr lang="en-GB" dirty="0"/>
-          </a:p>
-          <a:p>
-            <a:pPr marL="457200" indent="-457200">
-              <a:buFont typeface="+mj-lt"/>
-              <a:buAutoNum type="arabicPeriod"/>
-            </a:pPr>
-            <a:r>
-              <a:rPr lang="en-GB" dirty="0"/>
-              <a:t>Widgets &amp; interface</a:t>
-            </a:r>
-          </a:p>
-          <a:p>
-            <a:pPr marL="457200" indent="-457200">
-              <a:buFont typeface="+mj-lt"/>
-              <a:buAutoNum type="arabicPeriod"/>
-            </a:pPr>
-            <a:r>
-              <a:rPr lang="en-GB" dirty="0"/>
-              <a:t>Det store </a:t>
-            </a:r>
-            <a:r>
-              <a:rPr lang="en-GB" dirty="0" err="1"/>
-              <a:t>spørgsmål</a:t>
-            </a:r>
-            <a:r>
-              <a:rPr lang="en-GB" dirty="0"/>
-              <a:t>, </a:t>
-            </a:r>
-            <a:r>
-              <a:rPr lang="en-GB" dirty="0" err="1"/>
-              <a:t>modellen</a:t>
-            </a:r>
-            <a:r>
-              <a:rPr lang="en-GB" dirty="0"/>
-              <a:t> </a:t>
-            </a:r>
-            <a:r>
-              <a:rPr lang="en-GB" dirty="0" err="1"/>
-              <a:t>besvarer</a:t>
-            </a:r>
-            <a:endParaRPr lang="en-GB" dirty="0"/>
-          </a:p>
-          <a:p>
-            <a:pPr marL="457200" indent="-457200">
-              <a:buFont typeface="+mj-lt"/>
-              <a:buAutoNum type="arabicPeriod"/>
-            </a:pPr>
-            <a:r>
-              <a:rPr lang="en-GB" dirty="0"/>
-              <a:t>Mere </a:t>
-            </a:r>
-            <a:r>
-              <a:rPr lang="en-GB" dirty="0" err="1"/>
-              <a:t>specifikke</a:t>
-            </a:r>
-            <a:r>
-              <a:rPr lang="en-GB" dirty="0"/>
-              <a:t> </a:t>
-            </a:r>
-            <a:r>
-              <a:rPr lang="en-GB" dirty="0" err="1"/>
-              <a:t>eksempler</a:t>
-            </a:r>
-            <a:r>
-              <a:rPr lang="en-GB" dirty="0"/>
-              <a:t> </a:t>
-            </a:r>
-            <a:r>
-              <a:rPr lang="en-GB" dirty="0" err="1"/>
-              <a:t>og</a:t>
-            </a:r>
-            <a:r>
-              <a:rPr lang="en-GB" dirty="0"/>
-              <a:t> </a:t>
-            </a:r>
-            <a:r>
-              <a:rPr lang="en-GB" dirty="0" err="1"/>
-              <a:t>sammenligning</a:t>
-            </a:r>
-            <a:r>
-              <a:rPr lang="en-GB" dirty="0"/>
-              <a:t>. </a:t>
-            </a:r>
-            <a:r>
-              <a:rPr lang="en-GB" dirty="0" err="1"/>
-              <a:t>F.eks</a:t>
-            </a:r>
-            <a:r>
-              <a:rPr lang="en-GB" dirty="0"/>
-              <a:t>. </a:t>
-            </a:r>
-            <a:r>
-              <a:rPr lang="en-GB" dirty="0" err="1"/>
-              <a:t>økonomi</a:t>
-            </a:r>
-            <a:r>
-              <a:rPr lang="en-GB" dirty="0"/>
-              <a:t> &gt;&lt; </a:t>
-            </a:r>
-            <a:r>
-              <a:rPr lang="en-GB" dirty="0" err="1"/>
-              <a:t>sundhed</a:t>
-            </a:r>
-            <a:r>
-              <a:rPr lang="en-GB" dirty="0"/>
-              <a:t>. </a:t>
-            </a:r>
-            <a:r>
-              <a:rPr lang="en-GB" dirty="0" err="1"/>
-              <a:t>Forklar</a:t>
-            </a:r>
-            <a:r>
-              <a:rPr lang="en-GB" dirty="0"/>
-              <a:t>: </a:t>
-            </a:r>
-            <a:r>
-              <a:rPr lang="en-GB" dirty="0" err="1"/>
-              <a:t>hvorfor</a:t>
-            </a:r>
-            <a:r>
-              <a:rPr lang="en-GB" dirty="0"/>
-              <a:t> er det </a:t>
-            </a:r>
-            <a:r>
-              <a:rPr lang="en-GB" dirty="0" err="1"/>
-              <a:t>en</a:t>
-            </a:r>
-            <a:r>
-              <a:rPr lang="en-GB" dirty="0"/>
-              <a:t> </a:t>
-            </a:r>
-            <a:r>
-              <a:rPr lang="en-GB" dirty="0" err="1"/>
-              <a:t>spændende</a:t>
-            </a:r>
-            <a:r>
-              <a:rPr lang="en-GB" dirty="0"/>
-              <a:t> </a:t>
-            </a:r>
-            <a:r>
-              <a:rPr lang="en-GB" dirty="0" err="1"/>
-              <a:t>kontrast</a:t>
-            </a:r>
-            <a:r>
-              <a:rPr lang="en-GB" dirty="0"/>
-              <a:t>?</a:t>
-            </a:r>
-          </a:p>
-          <a:p>
-            <a:pPr marL="457200" indent="-457200">
-              <a:buFont typeface="+mj-lt"/>
-              <a:buAutoNum type="arabicPeriod"/>
-            </a:pPr>
-            <a:r>
-              <a:rPr lang="en-GB" dirty="0"/>
-              <a:t>"Download to try it out for yourself!"</a:t>
-            </a:r>
-          </a:p>
-          <a:p>
-            <a:pPr>
-              <a:buNone/>
-            </a:pPr>
             <a:endParaRPr lang="da-DK" dirty="0"/>
           </a:p>
         </p:txBody>
@@ -9839,7 +9632,7 @@
     </p:custDataLst>
     <p:extLst>
       <p:ext uri="{BB962C8B-B14F-4D97-AF65-F5344CB8AC3E}">
-        <p14:creationId xmlns:p14="http://schemas.microsoft.com/office/powerpoint/2010/main" val="409741556"/>
+        <p14:creationId xmlns:p14="http://schemas.microsoft.com/office/powerpoint/2010/main" val="2813365767"/>
       </p:ext>
     </p:extLst>
   </p:cSld>
@@ -9868,7 +9661,7 @@
       </p:grpSpPr>
       <p:sp>
         <p:nvSpPr>
-          <p:cNvPr id="3" name="Title 2"/>
+          <p:cNvPr id="4" name="Title 3"/>
           <p:cNvSpPr>
             <a:spLocks noGrp="1"/>
           </p:cNvSpPr>
@@ -9881,7 +9674,10 @@
           <a:bodyPr/>
           <a:lstStyle/>
           <a:p>
-            <a:endParaRPr lang="da-DK" dirty="0"/>
+            <a:r>
+              <a:rPr lang="da-DK" dirty="0"/>
+              <a:t>Overordnet indhold (note-slide)</a:t>
+            </a:r>
           </a:p>
         </p:txBody>
       </p:sp>
@@ -9900,6 +9696,210 @@
           <a:bodyPr/>
           <a:lstStyle/>
           <a:p>
+            <a:r>
+              <a:rPr lang="en-GB" dirty="0" err="1"/>
+              <a:t>Overordnet</a:t>
+            </a:r>
+            <a:r>
+              <a:rPr lang="en-GB" dirty="0"/>
+              <a:t> </a:t>
+            </a:r>
+            <a:r>
+              <a:rPr lang="en-GB" dirty="0" err="1"/>
+              <a:t>indhold</a:t>
+            </a:r>
+            <a:r>
+              <a:rPr lang="en-GB"/>
+              <a:t>:</a:t>
+            </a:r>
+            <a:br>
+              <a:rPr lang="en-GB"/>
+            </a:br>
+            <a:endParaRPr lang="en-GB" dirty="0"/>
+          </a:p>
+          <a:p>
+            <a:pPr marL="457200" indent="-457200">
+              <a:buFont typeface="+mj-lt"/>
+              <a:buAutoNum type="arabicPeriod"/>
+            </a:pPr>
+            <a:r>
+              <a:rPr lang="en-GB" dirty="0" err="1"/>
+              <a:t>Agentadfærd</a:t>
+            </a:r>
+            <a:endParaRPr lang="en-GB" dirty="0"/>
+          </a:p>
+          <a:p>
+            <a:pPr marL="457200" indent="-457200">
+              <a:buFont typeface="+mj-lt"/>
+              <a:buAutoNum type="arabicPeriod"/>
+            </a:pPr>
+            <a:r>
+              <a:rPr lang="en-GB" dirty="0" err="1"/>
+              <a:t>Undervisningskontekst</a:t>
+            </a:r>
+            <a:endParaRPr lang="en-GB" dirty="0"/>
+          </a:p>
+          <a:p>
+            <a:pPr marL="457200" indent="-457200">
+              <a:buFont typeface="+mj-lt"/>
+              <a:buAutoNum type="arabicPeriod"/>
+            </a:pPr>
+            <a:r>
+              <a:rPr lang="en-GB" dirty="0"/>
+              <a:t>Widgets &amp; interface</a:t>
+            </a:r>
+          </a:p>
+          <a:p>
+            <a:pPr marL="457200" indent="-457200">
+              <a:buFont typeface="+mj-lt"/>
+              <a:buAutoNum type="arabicPeriod"/>
+            </a:pPr>
+            <a:r>
+              <a:rPr lang="en-GB" dirty="0"/>
+              <a:t>Det store </a:t>
+            </a:r>
+            <a:r>
+              <a:rPr lang="en-GB" dirty="0" err="1"/>
+              <a:t>spørgsmål</a:t>
+            </a:r>
+            <a:r>
+              <a:rPr lang="en-GB" dirty="0"/>
+              <a:t>, </a:t>
+            </a:r>
+            <a:r>
+              <a:rPr lang="en-GB" dirty="0" err="1"/>
+              <a:t>modellen</a:t>
+            </a:r>
+            <a:r>
+              <a:rPr lang="en-GB" dirty="0"/>
+              <a:t> </a:t>
+            </a:r>
+            <a:r>
+              <a:rPr lang="en-GB" dirty="0" err="1"/>
+              <a:t>besvarer</a:t>
+            </a:r>
+            <a:endParaRPr lang="en-GB" dirty="0"/>
+          </a:p>
+          <a:p>
+            <a:pPr marL="457200" indent="-457200">
+              <a:buFont typeface="+mj-lt"/>
+              <a:buAutoNum type="arabicPeriod"/>
+            </a:pPr>
+            <a:r>
+              <a:rPr lang="en-GB" dirty="0"/>
+              <a:t>Mere </a:t>
+            </a:r>
+            <a:r>
+              <a:rPr lang="en-GB" dirty="0" err="1"/>
+              <a:t>specifikke</a:t>
+            </a:r>
+            <a:r>
+              <a:rPr lang="en-GB" dirty="0"/>
+              <a:t> </a:t>
+            </a:r>
+            <a:r>
+              <a:rPr lang="en-GB" dirty="0" err="1"/>
+              <a:t>eksempler</a:t>
+            </a:r>
+            <a:r>
+              <a:rPr lang="en-GB" dirty="0"/>
+              <a:t> </a:t>
+            </a:r>
+            <a:r>
+              <a:rPr lang="en-GB" dirty="0" err="1"/>
+              <a:t>og</a:t>
+            </a:r>
+            <a:r>
+              <a:rPr lang="en-GB" dirty="0"/>
+              <a:t> </a:t>
+            </a:r>
+            <a:r>
+              <a:rPr lang="en-GB" dirty="0" err="1"/>
+              <a:t>sammenligning</a:t>
+            </a:r>
+            <a:r>
+              <a:rPr lang="en-GB" dirty="0"/>
+              <a:t>. </a:t>
+            </a:r>
+            <a:r>
+              <a:rPr lang="en-GB" dirty="0" err="1"/>
+              <a:t>F.eks</a:t>
+            </a:r>
+            <a:r>
+              <a:rPr lang="en-GB" dirty="0"/>
+              <a:t>. </a:t>
+            </a:r>
+            <a:r>
+              <a:rPr lang="en-GB" dirty="0" err="1"/>
+              <a:t>økonomi</a:t>
+            </a:r>
+            <a:r>
+              <a:rPr lang="en-GB" dirty="0"/>
+              <a:t> &gt;&lt; </a:t>
+            </a:r>
+            <a:r>
+              <a:rPr lang="en-GB" dirty="0" err="1"/>
+              <a:t>sundhed</a:t>
+            </a:r>
+            <a:r>
+              <a:rPr lang="en-GB" dirty="0"/>
+              <a:t>. </a:t>
+            </a:r>
+            <a:r>
+              <a:rPr lang="en-GB" dirty="0" err="1"/>
+              <a:t>Forklar</a:t>
+            </a:r>
+            <a:r>
+              <a:rPr lang="en-GB" dirty="0"/>
+              <a:t>: </a:t>
+            </a:r>
+            <a:r>
+              <a:rPr lang="en-GB" dirty="0" err="1"/>
+              <a:t>hvorfor</a:t>
+            </a:r>
+            <a:r>
+              <a:rPr lang="en-GB" dirty="0"/>
+              <a:t> er det </a:t>
+            </a:r>
+            <a:r>
+              <a:rPr lang="en-GB" dirty="0" err="1"/>
+              <a:t>en</a:t>
+            </a:r>
+            <a:r>
+              <a:rPr lang="en-GB" dirty="0"/>
+              <a:t> </a:t>
+            </a:r>
+            <a:r>
+              <a:rPr lang="en-GB" dirty="0" err="1"/>
+              <a:t>spændende</a:t>
+            </a:r>
+            <a:r>
+              <a:rPr lang="en-GB" dirty="0"/>
+              <a:t> </a:t>
+            </a:r>
+            <a:r>
+              <a:rPr lang="en-GB" dirty="0" err="1"/>
+              <a:t>kontrast</a:t>
+            </a:r>
+            <a:r>
+              <a:rPr lang="en-GB" dirty="0"/>
+              <a:t>?</a:t>
+            </a:r>
+          </a:p>
+          <a:p>
+            <a:pPr marL="457200" indent="-457200">
+              <a:buFont typeface="+mj-lt"/>
+              <a:buAutoNum type="arabicPeriod"/>
+            </a:pPr>
+            <a:r>
+              <a:rPr lang="en-GB" dirty="0"/>
+              <a:t>"Download to try it out for yourself!"</a:t>
+            </a:r>
+          </a:p>
+          <a:p>
+            <a:pPr>
+              <a:buNone/>
+            </a:pPr>
             <a:endParaRPr lang="da-DK" dirty="0"/>
           </a:p>
         </p:txBody>
@@ -9910,7 +9910,7 @@
     </p:custDataLst>
     <p:extLst>
       <p:ext uri="{BB962C8B-B14F-4D97-AF65-F5344CB8AC3E}">
-        <p14:creationId xmlns:p14="http://schemas.microsoft.com/office/powerpoint/2010/main" val="2813365767"/>
+        <p14:creationId xmlns:p14="http://schemas.microsoft.com/office/powerpoint/2010/main" val="409741556"/>
       </p:ext>
     </p:extLst>
   </p:cSld>
@@ -10025,7 +10025,7 @@
           <a:p>
             <a:fld id="{EBD85B7D-E9A5-49E0-8ACF-AF93CE3E556F}" type="datetime1">
               <a:rPr lang="da-DK" smtClean="0"/>
-              <a:t>26.04.2021</a:t>
+              <a:t>26-04-2021</a:t>
             </a:fld>
             <a:r>
               <a:rPr lang="da-DK" dirty="0"/>
@@ -10120,13 +10120,13 @@
 
 <file path=ppt/tags/tag2.xml><?xml version="1.0" encoding="utf-8"?>
 <p:tagLst xmlns:a="http://schemas.openxmlformats.org/drawingml/2006/main" xmlns:r="http://schemas.openxmlformats.org/officeDocument/2006/relationships" xmlns:p="http://schemas.openxmlformats.org/presentationml/2006/main">
-  <p:tag name="TEMPLAFYSLIDEID" val="636235437375089291"/>
+  <p:tag name="TEMPLAFYSLIDEID" val="636235437374902238"/>
 </p:tagLst>
 </file>
 
 <file path=ppt/tags/tag3.xml><?xml version="1.0" encoding="utf-8"?>
 <p:tagLst xmlns:a="http://schemas.openxmlformats.org/drawingml/2006/main" xmlns:r="http://schemas.openxmlformats.org/officeDocument/2006/relationships" xmlns:p="http://schemas.openxmlformats.org/presentationml/2006/main">
-  <p:tag name="TEMPLAFYSLIDEID" val="636235437374902238"/>
+  <p:tag name="TEMPLAFYSLIDEID" val="636235437375089291"/>
 </p:tagLst>
 </file>
 

</xml_diff>

<commit_message>
importing stthomas picture from folder
</commit_message>
<xml_diff>
--- a/StThomas-PowerPoint-AU.pptx
+++ b/StThomas-PowerPoint-AU.pptx
@@ -5,54 +5,56 @@
     <p:sldMasterId id="2147483648" r:id="rId1"/>
   </p:sldMasterIdLst>
   <p:notesMasterIdLst>
-    <p:notesMasterId r:id="rId8"/>
+    <p:notesMasterId r:id="rId10"/>
   </p:notesMasterIdLst>
   <p:handoutMasterIdLst>
-    <p:handoutMasterId r:id="rId9"/>
+    <p:handoutMasterId r:id="rId11"/>
   </p:handoutMasterIdLst>
   <p:sldIdLst>
     <p:sldId id="261" r:id="rId2"/>
-    <p:sldId id="262" r:id="rId3"/>
-    <p:sldId id="265" r:id="rId4"/>
-    <p:sldId id="258" r:id="rId5"/>
-    <p:sldId id="264" r:id="rId6"/>
-    <p:sldId id="260" r:id="rId7"/>
+    <p:sldId id="266" r:id="rId3"/>
+    <p:sldId id="267" r:id="rId4"/>
+    <p:sldId id="268" r:id="rId5"/>
+    <p:sldId id="265" r:id="rId6"/>
+    <p:sldId id="258" r:id="rId7"/>
+    <p:sldId id="264" r:id="rId8"/>
+    <p:sldId id="260" r:id="rId9"/>
   </p:sldIdLst>
   <p:sldSz cx="12188825" cy="6858000"/>
   <p:notesSz cx="6797675" cy="9926638"/>
   <p:embeddedFontLst>
     <p:embeddedFont>
       <p:font typeface="AU Passata" panose="020B0604020202020204" charset="0"/>
-      <p:regular r:id="rId10"/>
-      <p:bold r:id="rId11"/>
-    </p:embeddedFont>
-    <p:embeddedFont>
-      <p:font typeface="AU Passata Light" panose="020B0604020202020204" charset="0"/>
       <p:regular r:id="rId12"/>
       <p:bold r:id="rId13"/>
     </p:embeddedFont>
     <p:embeddedFont>
-      <p:font typeface="AU Peto" panose="020B0604020202020204" charset="0"/>
+      <p:font typeface="AU Passata Light" panose="020B0604020202020204" charset="0"/>
       <p:regular r:id="rId14"/>
       <p:bold r:id="rId15"/>
     </p:embeddedFont>
     <p:embeddedFont>
-      <p:font typeface="Calibri" panose="020F0502020204030204" pitchFamily="34" charset="0"/>
+      <p:font typeface="AU Peto" panose="020B0604020202020204" charset="0"/>
       <p:regular r:id="rId16"/>
       <p:bold r:id="rId17"/>
-      <p:italic r:id="rId18"/>
-      <p:boldItalic r:id="rId19"/>
+    </p:embeddedFont>
+    <p:embeddedFont>
+      <p:font typeface="Calibri" panose="020F0502020204030204" pitchFamily="34" charset="0"/>
+      <p:regular r:id="rId18"/>
+      <p:bold r:id="rId19"/>
+      <p:italic r:id="rId20"/>
+      <p:boldItalic r:id="rId21"/>
     </p:embeddedFont>
     <p:embeddedFont>
       <p:font typeface="Georgia" panose="02040502050405020303" pitchFamily="18" charset="0"/>
-      <p:regular r:id="rId20"/>
-      <p:bold r:id="rId21"/>
-      <p:italic r:id="rId22"/>
-      <p:boldItalic r:id="rId23"/>
+      <p:regular r:id="rId22"/>
+      <p:bold r:id="rId23"/>
+      <p:italic r:id="rId24"/>
+      <p:boldItalic r:id="rId25"/>
     </p:embeddedFont>
     <p:embeddedFont>
       <p:font typeface="Wingdings 3" panose="05040102010807070707" pitchFamily="18" charset="2"/>
-      <p:regular r:id="rId24"/>
+      <p:regular r:id="rId26"/>
     </p:embeddedFont>
   </p:embeddedFontLst>
   <p:defaultTextStyle>
@@ -1009,7 +1011,7 @@
               <a:pPr>
                 <a:defRPr/>
               </a:pPr>
-              <a:t>3</a:t>
+              <a:t>5</a:t>
             </a:fld>
             <a:endParaRPr lang="en-GB" dirty="0"/>
           </a:p>
@@ -1099,7 +1101,7 @@
               <a:pPr>
                 <a:defRPr/>
               </a:pPr>
-              <a:t>4</a:t>
+              <a:t>6</a:t>
             </a:fld>
             <a:endParaRPr lang="en-GB" dirty="0"/>
           </a:p>
@@ -1189,7 +1191,7 @@
               <a:pPr>
                 <a:defRPr/>
               </a:pPr>
-              <a:t>6</a:t>
+              <a:t>8</a:t>
             </a:fld>
             <a:endParaRPr lang="en-GB" dirty="0"/>
           </a:p>
@@ -9543,14 +9545,31 @@
         </p:nvSpPr>
         <p:spPr>
           <a:xfrm>
-            <a:off x="985838" y="2897841"/>
-            <a:ext cx="10220325" cy="830997"/>
+            <a:off x="985838" y="2482343"/>
+            <a:ext cx="10220325" cy="1661993"/>
           </a:xfrm>
         </p:spPr>
         <p:txBody>
           <a:bodyPr/>
           <a:lstStyle/>
           <a:p>
+            <a:pPr algn="ctr"/>
+            <a:r>
+              <a:rPr lang="da-DK" dirty="0"/>
+              <a:t>Language </a:t>
+            </a:r>
+            <a:r>
+              <a:rPr lang="da-DK" dirty="0" err="1"/>
+              <a:t>development</a:t>
+            </a:r>
+            <a:r>
+              <a:rPr lang="da-DK" dirty="0"/>
+              <a:t> on </a:t>
+            </a:r>
+            <a:r>
+              <a:rPr lang="da-DK" dirty="0" err="1"/>
+              <a:t>SktThomas</a:t>
+            </a:r>
             <a:endParaRPr lang="da-DK" dirty="0"/>
           </a:p>
         </p:txBody>
@@ -9590,7 +9609,13 @@
       </p:grpSpPr>
       <p:sp>
         <p:nvSpPr>
-          <p:cNvPr id="3" name="Title 2"/>
+          <p:cNvPr id="2" name="Title 1">
+            <a:extLst>
+              <a:ext uri="{FF2B5EF4-FFF2-40B4-BE49-F238E27FC236}">
+                <a16:creationId xmlns:a16="http://schemas.microsoft.com/office/drawing/2014/main" id="{B0B05D0D-054D-437D-A29A-B9A30FA10FDB}"/>
+              </a:ext>
+            </a:extLst>
+          </p:cNvPr>
           <p:cNvSpPr>
             <a:spLocks noGrp="1"/>
           </p:cNvSpPr>
@@ -9603,18 +9628,160 @@
           <a:bodyPr/>
           <a:lstStyle/>
           <a:p>
+            <a:pPr algn="ctr"/>
+            <a:r>
+              <a:rPr lang="en-GB" dirty="0"/>
+              <a:t>Outcome of the class</a:t>
+            </a:r>
+            <a:endParaRPr lang="en-DK" dirty="0"/>
+          </a:p>
+        </p:txBody>
+      </p:sp>
+      <p:sp>
+        <p:nvSpPr>
+          <p:cNvPr id="3" name="Content Placeholder 2">
+            <a:extLst>
+              <a:ext uri="{FF2B5EF4-FFF2-40B4-BE49-F238E27FC236}">
+                <a16:creationId xmlns:a16="http://schemas.microsoft.com/office/drawing/2014/main" id="{F01897E7-99BE-42EE-ABAA-95D55AD9B027}"/>
+              </a:ext>
+            </a:extLst>
+          </p:cNvPr>
+          <p:cNvSpPr>
+            <a:spLocks noGrp="1"/>
+          </p:cNvSpPr>
+          <p:nvPr>
+            <p:ph idx="1"/>
+          </p:nvPr>
+        </p:nvSpPr>
+        <p:spPr/>
+        <p:txBody>
+          <a:bodyPr/>
+          <a:lstStyle/>
+          <a:p>
+            <a:endParaRPr lang="en-GB" dirty="0"/>
+          </a:p>
+          <a:p>
+            <a:pPr>
+              <a:buNone/>
+            </a:pPr>
+            <a:endParaRPr lang="en-GB" dirty="0"/>
+          </a:p>
+          <a:p>
+            <a:r>
+              <a:rPr lang="en-GB" dirty="0"/>
+              <a:t>- Get acquainted with the use of computational models in research</a:t>
+            </a:r>
+          </a:p>
+          <a:p>
+            <a:endParaRPr lang="en-GB" dirty="0"/>
+          </a:p>
+          <a:p>
+            <a:endParaRPr lang="en-GB" dirty="0"/>
+          </a:p>
+          <a:p>
+            <a:r>
+              <a:rPr lang="en-GB" dirty="0"/>
+              <a:t>- </a:t>
+            </a:r>
+            <a:r>
+              <a:rPr lang="da-DK" dirty="0"/>
+              <a:t>Agent </a:t>
+            </a:r>
+            <a:r>
+              <a:rPr lang="da-DK" dirty="0" err="1"/>
+              <a:t>Based</a:t>
+            </a:r>
+            <a:r>
+              <a:rPr lang="da-DK" dirty="0"/>
+              <a:t> Models as a </a:t>
+            </a:r>
+            <a:r>
+              <a:rPr lang="da-DK" dirty="0" err="1"/>
+              <a:t>tool</a:t>
+            </a:r>
+            <a:r>
+              <a:rPr lang="da-DK" dirty="0"/>
+              <a:t> to understand the </a:t>
+            </a:r>
+            <a:r>
+              <a:rPr lang="da-DK" dirty="0" err="1"/>
+              <a:t>dynamics</a:t>
+            </a:r>
+            <a:r>
+              <a:rPr lang="da-DK" dirty="0"/>
+              <a:t> of </a:t>
+            </a:r>
+            <a:r>
+              <a:rPr lang="da-DK" dirty="0" err="1"/>
+              <a:t>complex</a:t>
+            </a:r>
+            <a:r>
+              <a:rPr lang="da-DK" dirty="0"/>
+              <a:t> systems (</a:t>
+            </a:r>
+            <a:r>
+              <a:rPr lang="da-DK" dirty="0" err="1"/>
+              <a:t>language</a:t>
+            </a:r>
+            <a:r>
+              <a:rPr lang="da-DK" dirty="0"/>
+              <a:t> </a:t>
+            </a:r>
+            <a:r>
+              <a:rPr lang="da-DK" dirty="0" err="1"/>
+              <a:t>development</a:t>
+            </a:r>
+            <a:r>
+              <a:rPr lang="da-DK" dirty="0"/>
+              <a:t> on </a:t>
+            </a:r>
+            <a:r>
+              <a:rPr lang="da-DK" dirty="0" err="1"/>
+              <a:t>SktThomas</a:t>
+            </a:r>
+            <a:r>
+              <a:rPr lang="da-DK" dirty="0"/>
+              <a:t> in </a:t>
+            </a:r>
+            <a:r>
+              <a:rPr lang="da-DK" dirty="0" err="1"/>
+              <a:t>this</a:t>
+            </a:r>
+            <a:r>
+              <a:rPr lang="da-DK" dirty="0"/>
+              <a:t> </a:t>
+            </a:r>
+            <a:r>
+              <a:rPr lang="da-DK" dirty="0" err="1"/>
+              <a:t>instance</a:t>
+            </a:r>
+            <a:r>
+              <a:rPr lang="da-DK" dirty="0"/>
+              <a:t>)</a:t>
+            </a:r>
+          </a:p>
+          <a:p>
             <a:endParaRPr lang="da-DK" dirty="0"/>
           </a:p>
-        </p:txBody>
-      </p:sp>
-      <p:sp>
-        <p:nvSpPr>
-          <p:cNvPr id="5" name="Content Placeholder 4"/>
+          <a:p>
+            <a:endParaRPr lang="en-DK" dirty="0"/>
+          </a:p>
+        </p:txBody>
+      </p:sp>
+      <p:sp>
+        <p:nvSpPr>
+          <p:cNvPr id="4" name="Date Placeholder 3">
+            <a:extLst>
+              <a:ext uri="{FF2B5EF4-FFF2-40B4-BE49-F238E27FC236}">
+                <a16:creationId xmlns:a16="http://schemas.microsoft.com/office/drawing/2014/main" id="{E3387D70-7B00-44DD-A139-298D76293441}"/>
+              </a:ext>
+            </a:extLst>
+          </p:cNvPr>
           <p:cNvSpPr>
             <a:spLocks noGrp="1"/>
           </p:cNvSpPr>
           <p:nvPr>
-            <p:ph idx="1"/>
+            <p:ph type="dt" sz="half" idx="10"/>
           </p:nvPr>
         </p:nvSpPr>
         <p:spPr/>
@@ -9622,17 +9789,22 @@
           <a:bodyPr/>
           <a:lstStyle/>
           <a:p>
+            <a:fld id="{08FC4984-4D2F-4D18-8CCC-C258B92EB11B}" type="datetime1">
+              <a:rPr lang="da-DK" smtClean="0"/>
+              <a:t>26-04-2021</a:t>
+            </a:fld>
+            <a:r>
+              <a:rPr lang="da-DK"/>
+              <a:t>26-04-2021</a:t>
+            </a:r>
             <a:endParaRPr lang="da-DK" dirty="0"/>
           </a:p>
         </p:txBody>
       </p:sp>
     </p:spTree>
-    <p:custDataLst>
-      <p:tags r:id="rId1"/>
-    </p:custDataLst>
     <p:extLst>
       <p:ext uri="{BB962C8B-B14F-4D97-AF65-F5344CB8AC3E}">
-        <p14:creationId xmlns:p14="http://schemas.microsoft.com/office/powerpoint/2010/main" val="2813365767"/>
+        <p14:creationId xmlns:p14="http://schemas.microsoft.com/office/powerpoint/2010/main" val="3857496078"/>
       </p:ext>
     </p:extLst>
   </p:cSld>
@@ -9661,7 +9833,13 @@
       </p:grpSpPr>
       <p:sp>
         <p:nvSpPr>
-          <p:cNvPr id="4" name="Title 3"/>
+          <p:cNvPr id="2" name="Title 1">
+            <a:extLst>
+              <a:ext uri="{FF2B5EF4-FFF2-40B4-BE49-F238E27FC236}">
+                <a16:creationId xmlns:a16="http://schemas.microsoft.com/office/drawing/2014/main" id="{7C54031D-B90E-4538-9217-358114AB1F30}"/>
+              </a:ext>
+            </a:extLst>
+          </p:cNvPr>
           <p:cNvSpPr>
             <a:spLocks noGrp="1"/>
           </p:cNvSpPr>
@@ -9674,16 +9852,20 @@
           <a:bodyPr/>
           <a:lstStyle/>
           <a:p>
-            <a:r>
-              <a:rPr lang="da-DK" dirty="0"/>
-              <a:t>Overordnet indhold (note-slide)</a:t>
-            </a:r>
-          </a:p>
-        </p:txBody>
-      </p:sp>
-      <p:sp>
-        <p:nvSpPr>
-          <p:cNvPr id="5" name="Content Placeholder 4"/>
+            <a:pPr algn="ctr"/>
+            <a:endParaRPr lang="en-DK" dirty="0"/>
+          </a:p>
+        </p:txBody>
+      </p:sp>
+      <p:sp>
+        <p:nvSpPr>
+          <p:cNvPr id="3" name="Content Placeholder 2">
+            <a:extLst>
+              <a:ext uri="{FF2B5EF4-FFF2-40B4-BE49-F238E27FC236}">
+                <a16:creationId xmlns:a16="http://schemas.microsoft.com/office/drawing/2014/main" id="{4989B015-9128-402D-A158-350F5B3B4A9E}"/>
+              </a:ext>
+            </a:extLst>
+          </p:cNvPr>
           <p:cNvSpPr>
             <a:spLocks noGrp="1"/>
           </p:cNvSpPr>
@@ -9696,221 +9878,47 @@
           <a:bodyPr/>
           <a:lstStyle/>
           <a:p>
-            <a:r>
-              <a:rPr lang="en-GB" dirty="0" err="1"/>
-              <a:t>Overordnet</a:t>
-            </a:r>
-            <a:r>
-              <a:rPr lang="en-GB" dirty="0"/>
-              <a:t> </a:t>
-            </a:r>
-            <a:r>
-              <a:rPr lang="en-GB" dirty="0" err="1"/>
-              <a:t>indhold</a:t>
-            </a:r>
-            <a:r>
-              <a:rPr lang="en-GB"/>
-              <a:t>:</a:t>
-            </a:r>
-            <a:br>
-              <a:rPr lang="en-GB"/>
-            </a:br>
-            <a:endParaRPr lang="en-GB" dirty="0"/>
-          </a:p>
-          <a:p>
-            <a:pPr marL="457200" indent="-457200">
-              <a:buFont typeface="+mj-lt"/>
-              <a:buAutoNum type="arabicPeriod"/>
-            </a:pPr>
-            <a:r>
-              <a:rPr lang="en-GB" dirty="0" err="1"/>
-              <a:t>Agentadfærd</a:t>
-            </a:r>
-            <a:endParaRPr lang="en-GB" dirty="0"/>
-          </a:p>
-          <a:p>
-            <a:pPr marL="457200" indent="-457200">
-              <a:buFont typeface="+mj-lt"/>
-              <a:buAutoNum type="arabicPeriod"/>
-            </a:pPr>
-            <a:r>
-              <a:rPr lang="en-GB" dirty="0" err="1"/>
-              <a:t>Undervisningskontekst</a:t>
-            </a:r>
-            <a:endParaRPr lang="en-GB" dirty="0"/>
-          </a:p>
-          <a:p>
-            <a:pPr marL="457200" indent="-457200">
-              <a:buFont typeface="+mj-lt"/>
-              <a:buAutoNum type="arabicPeriod"/>
-            </a:pPr>
-            <a:r>
-              <a:rPr lang="en-GB" dirty="0"/>
-              <a:t>Widgets &amp; interface</a:t>
-            </a:r>
-          </a:p>
-          <a:p>
-            <a:pPr marL="457200" indent="-457200">
-              <a:buFont typeface="+mj-lt"/>
-              <a:buAutoNum type="arabicPeriod"/>
-            </a:pPr>
-            <a:r>
-              <a:rPr lang="en-GB" dirty="0"/>
-              <a:t>Det store </a:t>
-            </a:r>
-            <a:r>
-              <a:rPr lang="en-GB" dirty="0" err="1"/>
-              <a:t>spørgsmål</a:t>
-            </a:r>
-            <a:r>
-              <a:rPr lang="en-GB" dirty="0"/>
-              <a:t>, </a:t>
-            </a:r>
-            <a:r>
-              <a:rPr lang="en-GB" dirty="0" err="1"/>
-              <a:t>modellen</a:t>
-            </a:r>
-            <a:r>
-              <a:rPr lang="en-GB" dirty="0"/>
-              <a:t> </a:t>
-            </a:r>
-            <a:r>
-              <a:rPr lang="en-GB" dirty="0" err="1"/>
-              <a:t>besvarer</a:t>
-            </a:r>
-            <a:endParaRPr lang="en-GB" dirty="0"/>
-          </a:p>
-          <a:p>
-            <a:pPr marL="457200" indent="-457200">
-              <a:buFont typeface="+mj-lt"/>
-              <a:buAutoNum type="arabicPeriod"/>
-            </a:pPr>
-            <a:r>
-              <a:rPr lang="en-GB" dirty="0"/>
-              <a:t>Mere </a:t>
-            </a:r>
-            <a:r>
-              <a:rPr lang="en-GB" dirty="0" err="1"/>
-              <a:t>specifikke</a:t>
-            </a:r>
-            <a:r>
-              <a:rPr lang="en-GB" dirty="0"/>
-              <a:t> </a:t>
-            </a:r>
-            <a:r>
-              <a:rPr lang="en-GB" dirty="0" err="1"/>
-              <a:t>eksempler</a:t>
-            </a:r>
-            <a:r>
-              <a:rPr lang="en-GB" dirty="0"/>
-              <a:t> </a:t>
-            </a:r>
-            <a:r>
-              <a:rPr lang="en-GB" dirty="0" err="1"/>
-              <a:t>og</a:t>
-            </a:r>
-            <a:r>
-              <a:rPr lang="en-GB" dirty="0"/>
-              <a:t> </a:t>
-            </a:r>
-            <a:r>
-              <a:rPr lang="en-GB" dirty="0" err="1"/>
-              <a:t>sammenligning</a:t>
-            </a:r>
-            <a:r>
-              <a:rPr lang="en-GB" dirty="0"/>
-              <a:t>. </a:t>
-            </a:r>
-            <a:r>
-              <a:rPr lang="en-GB" dirty="0" err="1"/>
-              <a:t>F.eks</a:t>
-            </a:r>
-            <a:r>
-              <a:rPr lang="en-GB" dirty="0"/>
-              <a:t>. </a:t>
-            </a:r>
-            <a:r>
-              <a:rPr lang="en-GB" dirty="0" err="1"/>
-              <a:t>økonomi</a:t>
-            </a:r>
-            <a:r>
-              <a:rPr lang="en-GB" dirty="0"/>
-              <a:t> &gt;&lt; </a:t>
-            </a:r>
-            <a:r>
-              <a:rPr lang="en-GB" dirty="0" err="1"/>
-              <a:t>sundhed</a:t>
-            </a:r>
-            <a:r>
-              <a:rPr lang="en-GB" dirty="0"/>
-              <a:t>. </a:t>
-            </a:r>
-            <a:r>
-              <a:rPr lang="en-GB" dirty="0" err="1"/>
-              <a:t>Forklar</a:t>
-            </a:r>
-            <a:r>
-              <a:rPr lang="en-GB" dirty="0"/>
-              <a:t>: </a:t>
-            </a:r>
-            <a:r>
-              <a:rPr lang="en-GB" dirty="0" err="1"/>
-              <a:t>hvorfor</a:t>
-            </a:r>
-            <a:r>
-              <a:rPr lang="en-GB" dirty="0"/>
-              <a:t> er det </a:t>
-            </a:r>
-            <a:r>
-              <a:rPr lang="en-GB" dirty="0" err="1"/>
-              <a:t>en</a:t>
-            </a:r>
-            <a:r>
-              <a:rPr lang="en-GB" dirty="0"/>
-              <a:t> </a:t>
-            </a:r>
-            <a:r>
-              <a:rPr lang="en-GB" dirty="0" err="1"/>
-              <a:t>spændende</a:t>
-            </a:r>
-            <a:r>
-              <a:rPr lang="en-GB" dirty="0"/>
-              <a:t> </a:t>
-            </a:r>
-            <a:r>
-              <a:rPr lang="en-GB" dirty="0" err="1"/>
-              <a:t>kontrast</a:t>
-            </a:r>
-            <a:r>
-              <a:rPr lang="en-GB" dirty="0"/>
-              <a:t>?</a:t>
-            </a:r>
-          </a:p>
-          <a:p>
-            <a:pPr marL="457200" indent="-457200">
-              <a:buFont typeface="+mj-lt"/>
-              <a:buAutoNum type="arabicPeriod"/>
-            </a:pPr>
-            <a:r>
-              <a:rPr lang="en-GB" dirty="0"/>
-              <a:t>"Download to try it out for yourself!"</a:t>
-            </a:r>
-          </a:p>
-          <a:p>
-            <a:pPr>
-              <a:buNone/>
-            </a:pPr>
+            <a:endParaRPr lang="en-DK"/>
+          </a:p>
+        </p:txBody>
+      </p:sp>
+      <p:sp>
+        <p:nvSpPr>
+          <p:cNvPr id="4" name="Date Placeholder 3">
+            <a:extLst>
+              <a:ext uri="{FF2B5EF4-FFF2-40B4-BE49-F238E27FC236}">
+                <a16:creationId xmlns:a16="http://schemas.microsoft.com/office/drawing/2014/main" id="{D8E35336-EB6F-4D24-806E-DD471296C113}"/>
+              </a:ext>
+            </a:extLst>
+          </p:cNvPr>
+          <p:cNvSpPr>
+            <a:spLocks noGrp="1"/>
+          </p:cNvSpPr>
+          <p:nvPr>
+            <p:ph type="dt" sz="half" idx="10"/>
+          </p:nvPr>
+        </p:nvSpPr>
+        <p:spPr/>
+        <p:txBody>
+          <a:bodyPr/>
+          <a:lstStyle/>
+          <a:p>
+            <a:fld id="{6A738EED-D014-4517-9F81-EEA0CA3BE1DD}" type="datetime1">
+              <a:rPr lang="da-DK" smtClean="0"/>
+              <a:t>26-04-2021</a:t>
+            </a:fld>
+            <a:r>
+              <a:rPr lang="da-DK"/>
+              <a:t>26-04-2021</a:t>
+            </a:r>
             <a:endParaRPr lang="da-DK" dirty="0"/>
           </a:p>
         </p:txBody>
       </p:sp>
     </p:spTree>
-    <p:custDataLst>
-      <p:tags r:id="rId1"/>
-    </p:custDataLst>
     <p:extLst>
       <p:ext uri="{BB962C8B-B14F-4D97-AF65-F5344CB8AC3E}">
-        <p14:creationId xmlns:p14="http://schemas.microsoft.com/office/powerpoint/2010/main" val="409741556"/>
+        <p14:creationId xmlns:p14="http://schemas.microsoft.com/office/powerpoint/2010/main" val="2514723404"/>
       </p:ext>
     </p:extLst>
   </p:cSld>
@@ -9939,7 +9947,13 @@
       </p:grpSpPr>
       <p:sp>
         <p:nvSpPr>
-          <p:cNvPr id="4" name="Title 3"/>
+          <p:cNvPr id="2" name="Title 1">
+            <a:extLst>
+              <a:ext uri="{FF2B5EF4-FFF2-40B4-BE49-F238E27FC236}">
+                <a16:creationId xmlns:a16="http://schemas.microsoft.com/office/drawing/2014/main" id="{80B52791-91D2-4A40-A255-9DE3C3775730}"/>
+              </a:ext>
+            </a:extLst>
+          </p:cNvPr>
           <p:cNvSpPr>
             <a:spLocks noGrp="1"/>
           </p:cNvSpPr>
@@ -9952,36 +9966,72 @@
           <a:bodyPr/>
           <a:lstStyle/>
           <a:p>
+            <a:endParaRPr lang="en-DK"/>
+          </a:p>
+        </p:txBody>
+      </p:sp>
+      <p:sp>
+        <p:nvSpPr>
+          <p:cNvPr id="3" name="Content Placeholder 2">
+            <a:extLst>
+              <a:ext uri="{FF2B5EF4-FFF2-40B4-BE49-F238E27FC236}">
+                <a16:creationId xmlns:a16="http://schemas.microsoft.com/office/drawing/2014/main" id="{7500B101-62D7-4D25-AE2A-6B99F00B0A9D}"/>
+              </a:ext>
+            </a:extLst>
+          </p:cNvPr>
+          <p:cNvSpPr>
+            <a:spLocks noGrp="1"/>
+          </p:cNvSpPr>
+          <p:nvPr>
+            <p:ph idx="1"/>
+          </p:nvPr>
+        </p:nvSpPr>
+        <p:spPr/>
+        <p:txBody>
+          <a:bodyPr/>
+          <a:lstStyle/>
+          <a:p>
+            <a:endParaRPr lang="en-DK"/>
+          </a:p>
+        </p:txBody>
+      </p:sp>
+      <p:sp>
+        <p:nvSpPr>
+          <p:cNvPr id="4" name="Date Placeholder 3">
+            <a:extLst>
+              <a:ext uri="{FF2B5EF4-FFF2-40B4-BE49-F238E27FC236}">
+                <a16:creationId xmlns:a16="http://schemas.microsoft.com/office/drawing/2014/main" id="{696BCBD1-E5ED-4B98-B472-4981EDA29936}"/>
+              </a:ext>
+            </a:extLst>
+          </p:cNvPr>
+          <p:cNvSpPr>
+            <a:spLocks noGrp="1"/>
+          </p:cNvSpPr>
+          <p:nvPr>
+            <p:ph type="dt" sz="half" idx="10"/>
+          </p:nvPr>
+        </p:nvSpPr>
+        <p:spPr/>
+        <p:txBody>
+          <a:bodyPr/>
+          <a:lstStyle/>
+          <a:p>
+            <a:fld id="{8187665F-DB8B-4FE9-A720-86C04E6E45E4}" type="datetime1">
+              <a:rPr lang="da-DK" smtClean="0"/>
+              <a:t>26-04-2021</a:t>
+            </a:fld>
+            <a:r>
+              <a:rPr lang="da-DK"/>
+              <a:t>26-04-2021</a:t>
+            </a:r>
             <a:endParaRPr lang="da-DK" dirty="0"/>
           </a:p>
         </p:txBody>
       </p:sp>
-      <p:sp>
-        <p:nvSpPr>
-          <p:cNvPr id="5" name="Content Placeholder 4"/>
-          <p:cNvSpPr>
-            <a:spLocks noGrp="1"/>
-          </p:cNvSpPr>
-          <p:nvPr>
-            <p:ph idx="1"/>
-          </p:nvPr>
-        </p:nvSpPr>
-        <p:spPr/>
-        <p:txBody>
-          <a:bodyPr/>
-          <a:lstStyle/>
-          <a:p>
-            <a:endParaRPr lang="da-DK" dirty="0"/>
-          </a:p>
-        </p:txBody>
-      </p:sp>
     </p:spTree>
-    <p:custDataLst>
-      <p:tags r:id="rId1"/>
-    </p:custDataLst>
     <p:extLst>
       <p:ext uri="{BB962C8B-B14F-4D97-AF65-F5344CB8AC3E}">
-        <p14:creationId xmlns:p14="http://schemas.microsoft.com/office/powerpoint/2010/main" val="3535925220"/>
+        <p14:creationId xmlns:p14="http://schemas.microsoft.com/office/powerpoint/2010/main" val="2664871700"/>
       </p:ext>
     </p:extLst>
   </p:cSld>
@@ -10010,6 +10060,355 @@
       </p:grpSpPr>
       <p:sp>
         <p:nvSpPr>
+          <p:cNvPr id="4" name="Title 3"/>
+          <p:cNvSpPr>
+            <a:spLocks noGrp="1"/>
+          </p:cNvSpPr>
+          <p:nvPr>
+            <p:ph type="title"/>
+          </p:nvPr>
+        </p:nvSpPr>
+        <p:spPr/>
+        <p:txBody>
+          <a:bodyPr/>
+          <a:lstStyle/>
+          <a:p>
+            <a:r>
+              <a:rPr lang="da-DK" dirty="0"/>
+              <a:t>Overordnet indhold (note-slide)</a:t>
+            </a:r>
+          </a:p>
+        </p:txBody>
+      </p:sp>
+      <p:sp>
+        <p:nvSpPr>
+          <p:cNvPr id="5" name="Content Placeholder 4"/>
+          <p:cNvSpPr>
+            <a:spLocks noGrp="1"/>
+          </p:cNvSpPr>
+          <p:nvPr>
+            <p:ph idx="1"/>
+          </p:nvPr>
+        </p:nvSpPr>
+        <p:spPr/>
+        <p:txBody>
+          <a:bodyPr/>
+          <a:lstStyle/>
+          <a:p>
+            <a:r>
+              <a:rPr lang="en-GB" dirty="0" err="1"/>
+              <a:t>Overordnet</a:t>
+            </a:r>
+            <a:r>
+              <a:rPr lang="en-GB" dirty="0"/>
+              <a:t> </a:t>
+            </a:r>
+            <a:r>
+              <a:rPr lang="en-GB" dirty="0" err="1"/>
+              <a:t>indhold</a:t>
+            </a:r>
+            <a:r>
+              <a:rPr lang="en-GB" dirty="0"/>
+              <a:t>:</a:t>
+            </a:r>
+            <a:br>
+              <a:rPr lang="en-GB" dirty="0"/>
+            </a:br>
+            <a:endParaRPr lang="en-GB" dirty="0"/>
+          </a:p>
+          <a:p>
+            <a:pPr marL="457200" indent="-457200">
+              <a:buFont typeface="+mj-lt"/>
+              <a:buAutoNum type="arabicPeriod"/>
+            </a:pPr>
+            <a:r>
+              <a:rPr lang="en-GB" dirty="0" err="1"/>
+              <a:t>Undervisningskontekst</a:t>
+            </a:r>
+            <a:endParaRPr lang="en-GB" dirty="0"/>
+          </a:p>
+          <a:p>
+            <a:pPr marL="457200" indent="-457200">
+              <a:buFont typeface="+mj-lt"/>
+              <a:buAutoNum type="arabicPeriod"/>
+            </a:pPr>
+            <a:r>
+              <a:rPr lang="en-GB" dirty="0" err="1"/>
+              <a:t>Agentadfærd</a:t>
+            </a:r>
+            <a:endParaRPr lang="en-GB" dirty="0"/>
+          </a:p>
+          <a:p>
+            <a:pPr marL="457200" indent="-457200">
+              <a:buFont typeface="+mj-lt"/>
+              <a:buAutoNum type="arabicPeriod"/>
+            </a:pPr>
+            <a:r>
+              <a:rPr lang="en-GB" dirty="0"/>
+              <a:t>Widgets &amp; interface</a:t>
+            </a:r>
+          </a:p>
+          <a:p>
+            <a:pPr marL="457200" indent="-457200">
+              <a:buFont typeface="+mj-lt"/>
+              <a:buAutoNum type="arabicPeriod"/>
+            </a:pPr>
+            <a:r>
+              <a:rPr lang="en-GB" dirty="0"/>
+              <a:t>Det store </a:t>
+            </a:r>
+            <a:r>
+              <a:rPr lang="en-GB" dirty="0" err="1"/>
+              <a:t>spørgsmål</a:t>
+            </a:r>
+            <a:r>
+              <a:rPr lang="en-GB" dirty="0"/>
+              <a:t>, </a:t>
+            </a:r>
+            <a:r>
+              <a:rPr lang="en-GB" dirty="0" err="1"/>
+              <a:t>modellen</a:t>
+            </a:r>
+            <a:r>
+              <a:rPr lang="en-GB" dirty="0"/>
+              <a:t> </a:t>
+            </a:r>
+            <a:r>
+              <a:rPr lang="en-GB" dirty="0" err="1"/>
+              <a:t>besvarer</a:t>
+            </a:r>
+            <a:endParaRPr lang="en-GB" dirty="0"/>
+          </a:p>
+          <a:p>
+            <a:pPr marL="457200" indent="-457200">
+              <a:buFont typeface="+mj-lt"/>
+              <a:buAutoNum type="arabicPeriod"/>
+            </a:pPr>
+            <a:r>
+              <a:rPr lang="en-GB" dirty="0"/>
+              <a:t>Mere </a:t>
+            </a:r>
+            <a:r>
+              <a:rPr lang="en-GB" dirty="0" err="1"/>
+              <a:t>specifikke</a:t>
+            </a:r>
+            <a:r>
+              <a:rPr lang="en-GB" dirty="0"/>
+              <a:t> </a:t>
+            </a:r>
+            <a:r>
+              <a:rPr lang="en-GB" dirty="0" err="1"/>
+              <a:t>eksempler</a:t>
+            </a:r>
+            <a:r>
+              <a:rPr lang="en-GB" dirty="0"/>
+              <a:t> </a:t>
+            </a:r>
+            <a:r>
+              <a:rPr lang="en-GB" dirty="0" err="1"/>
+              <a:t>og</a:t>
+            </a:r>
+            <a:r>
+              <a:rPr lang="en-GB" dirty="0"/>
+              <a:t> </a:t>
+            </a:r>
+            <a:r>
+              <a:rPr lang="en-GB" dirty="0" err="1"/>
+              <a:t>sammenligning</a:t>
+            </a:r>
+            <a:r>
+              <a:rPr lang="en-GB" dirty="0"/>
+              <a:t>. </a:t>
+            </a:r>
+            <a:r>
+              <a:rPr lang="en-GB" dirty="0" err="1"/>
+              <a:t>F.eks</a:t>
+            </a:r>
+            <a:r>
+              <a:rPr lang="en-GB" dirty="0"/>
+              <a:t>. </a:t>
+            </a:r>
+            <a:r>
+              <a:rPr lang="en-GB" dirty="0" err="1"/>
+              <a:t>økonomi</a:t>
+            </a:r>
+            <a:r>
+              <a:rPr lang="en-GB" dirty="0"/>
+              <a:t> &gt;&lt; </a:t>
+            </a:r>
+            <a:r>
+              <a:rPr lang="en-GB" dirty="0" err="1"/>
+              <a:t>sundhed</a:t>
+            </a:r>
+            <a:r>
+              <a:rPr lang="en-GB" dirty="0"/>
+              <a:t>. </a:t>
+            </a:r>
+            <a:r>
+              <a:rPr lang="en-GB" dirty="0" err="1"/>
+              <a:t>Forklar</a:t>
+            </a:r>
+            <a:r>
+              <a:rPr lang="en-GB" dirty="0"/>
+              <a:t>: </a:t>
+            </a:r>
+            <a:r>
+              <a:rPr lang="en-GB" dirty="0" err="1"/>
+              <a:t>hvorfor</a:t>
+            </a:r>
+            <a:r>
+              <a:rPr lang="en-GB" dirty="0"/>
+              <a:t> er det </a:t>
+            </a:r>
+            <a:r>
+              <a:rPr lang="en-GB" dirty="0" err="1"/>
+              <a:t>en</a:t>
+            </a:r>
+            <a:r>
+              <a:rPr lang="en-GB" dirty="0"/>
+              <a:t> </a:t>
+            </a:r>
+            <a:r>
+              <a:rPr lang="en-GB" dirty="0" err="1"/>
+              <a:t>spændende</a:t>
+            </a:r>
+            <a:r>
+              <a:rPr lang="en-GB" dirty="0"/>
+              <a:t> </a:t>
+            </a:r>
+            <a:r>
+              <a:rPr lang="en-GB" dirty="0" err="1"/>
+              <a:t>kontrast</a:t>
+            </a:r>
+            <a:r>
+              <a:rPr lang="en-GB" dirty="0"/>
+              <a:t>?</a:t>
+            </a:r>
+          </a:p>
+          <a:p>
+            <a:pPr marL="457200" indent="-457200">
+              <a:buFont typeface="+mj-lt"/>
+              <a:buAutoNum type="arabicPeriod"/>
+            </a:pPr>
+            <a:r>
+              <a:rPr lang="en-GB" dirty="0"/>
+              <a:t>"Download to try it out for yourself!"</a:t>
+            </a:r>
+          </a:p>
+          <a:p>
+            <a:pPr>
+              <a:buNone/>
+            </a:pPr>
+            <a:endParaRPr lang="da-DK" dirty="0"/>
+          </a:p>
+        </p:txBody>
+      </p:sp>
+    </p:spTree>
+    <p:custDataLst>
+      <p:tags r:id="rId1"/>
+    </p:custDataLst>
+    <p:extLst>
+      <p:ext uri="{BB962C8B-B14F-4D97-AF65-F5344CB8AC3E}">
+        <p14:creationId xmlns:p14="http://schemas.microsoft.com/office/powerpoint/2010/main" val="409741556"/>
+      </p:ext>
+    </p:extLst>
+  </p:cSld>
+  <p:clrMapOvr>
+    <a:masterClrMapping/>
+  </p:clrMapOvr>
+</p:sld>
+</file>
+
+<file path=ppt/slides/slide6.xml><?xml version="1.0" encoding="utf-8"?>
+<p:sld xmlns:a="http://schemas.openxmlformats.org/drawingml/2006/main" xmlns:r="http://schemas.openxmlformats.org/officeDocument/2006/relationships" xmlns:p="http://schemas.openxmlformats.org/presentationml/2006/main">
+  <p:cSld>
+    <p:spTree>
+      <p:nvGrpSpPr>
+        <p:cNvPr id="1" name=""/>
+        <p:cNvGrpSpPr/>
+        <p:nvPr/>
+      </p:nvGrpSpPr>
+      <p:grpSpPr>
+        <a:xfrm>
+          <a:off x="0" y="0"/>
+          <a:ext cx="0" cy="0"/>
+          <a:chOff x="0" y="0"/>
+          <a:chExt cx="0" cy="0"/>
+        </a:xfrm>
+      </p:grpSpPr>
+      <p:sp>
+        <p:nvSpPr>
+          <p:cNvPr id="4" name="Title 3"/>
+          <p:cNvSpPr>
+            <a:spLocks noGrp="1"/>
+          </p:cNvSpPr>
+          <p:nvPr>
+            <p:ph type="title"/>
+          </p:nvPr>
+        </p:nvSpPr>
+        <p:spPr/>
+        <p:txBody>
+          <a:bodyPr/>
+          <a:lstStyle/>
+          <a:p>
+            <a:endParaRPr lang="da-DK" dirty="0"/>
+          </a:p>
+        </p:txBody>
+      </p:sp>
+      <p:sp>
+        <p:nvSpPr>
+          <p:cNvPr id="5" name="Content Placeholder 4"/>
+          <p:cNvSpPr>
+            <a:spLocks noGrp="1"/>
+          </p:cNvSpPr>
+          <p:nvPr>
+            <p:ph idx="1"/>
+          </p:nvPr>
+        </p:nvSpPr>
+        <p:spPr/>
+        <p:txBody>
+          <a:bodyPr/>
+          <a:lstStyle/>
+          <a:p>
+            <a:endParaRPr lang="da-DK" dirty="0"/>
+          </a:p>
+        </p:txBody>
+      </p:sp>
+    </p:spTree>
+    <p:custDataLst>
+      <p:tags r:id="rId1"/>
+    </p:custDataLst>
+    <p:extLst>
+      <p:ext uri="{BB962C8B-B14F-4D97-AF65-F5344CB8AC3E}">
+        <p14:creationId xmlns:p14="http://schemas.microsoft.com/office/powerpoint/2010/main" val="3535925220"/>
+      </p:ext>
+    </p:extLst>
+  </p:cSld>
+  <p:clrMapOvr>
+    <a:masterClrMapping/>
+  </p:clrMapOvr>
+</p:sld>
+</file>
+
+<file path=ppt/slides/slide7.xml><?xml version="1.0" encoding="utf-8"?>
+<p:sld xmlns:a="http://schemas.openxmlformats.org/drawingml/2006/main" xmlns:r="http://schemas.openxmlformats.org/officeDocument/2006/relationships" xmlns:p="http://schemas.openxmlformats.org/presentationml/2006/main">
+  <p:cSld>
+    <p:spTree>
+      <p:nvGrpSpPr>
+        <p:cNvPr id="1" name=""/>
+        <p:cNvGrpSpPr/>
+        <p:nvPr/>
+      </p:nvGrpSpPr>
+      <p:grpSpPr>
+        <a:xfrm>
+          <a:off x="0" y="0"/>
+          <a:ext cx="0" cy="0"/>
+          <a:chOff x="0" y="0"/>
+          <a:chExt cx="0" cy="0"/>
+        </a:xfrm>
+      </p:grpSpPr>
+      <p:sp>
+        <p:nvSpPr>
           <p:cNvPr id="2" name="Date Placeholder 1"/>
           <p:cNvSpPr>
             <a:spLocks noGrp="1"/>
@@ -10079,7 +10478,7 @@
 </p:sld>
 </file>
 
-<file path=ppt/slides/slide6.xml><?xml version="1.0" encoding="utf-8"?>
+<file path=ppt/slides/slide8.xml><?xml version="1.0" encoding="utf-8"?>
 <p:sld xmlns:a="http://schemas.openxmlformats.org/drawingml/2006/main" xmlns:r="http://schemas.openxmlformats.org/officeDocument/2006/relationships" xmlns:p="http://schemas.openxmlformats.org/presentationml/2006/main">
   <p:cSld>
     <p:spTree>
@@ -10120,7 +10519,7 @@
 
 <file path=ppt/tags/tag2.xml><?xml version="1.0" encoding="utf-8"?>
 <p:tagLst xmlns:a="http://schemas.openxmlformats.org/drawingml/2006/main" xmlns:r="http://schemas.openxmlformats.org/officeDocument/2006/relationships" xmlns:p="http://schemas.openxmlformats.org/presentationml/2006/main">
-  <p:tag name="TEMPLAFYSLIDEID" val="636235437374902238"/>
+  <p:tag name="TEMPLAFYSLIDEID" val="636235437375089291"/>
 </p:tagLst>
 </file>
 
@@ -10131,12 +10530,6 @@
 </file>
 
 <file path=ppt/tags/tag4.xml><?xml version="1.0" encoding="utf-8"?>
-<p:tagLst xmlns:a="http://schemas.openxmlformats.org/drawingml/2006/main" xmlns:r="http://schemas.openxmlformats.org/officeDocument/2006/relationships" xmlns:p="http://schemas.openxmlformats.org/presentationml/2006/main">
-  <p:tag name="TEMPLAFYSLIDEID" val="636235437375089291"/>
-</p:tagLst>
-</file>
-
-<file path=ppt/tags/tag5.xml><?xml version="1.0" encoding="utf-8"?>
 <p:tagLst xmlns:a="http://schemas.openxmlformats.org/drawingml/2006/main" xmlns:r="http://schemas.openxmlformats.org/officeDocument/2006/relationships" xmlns:p="http://schemas.openxmlformats.org/presentationml/2006/main">
   <p:tag name="TEMPLAFYSLIDEID" val="636235437375566864"/>
 </p:tagLst>

</xml_diff>